<commit_message>
Fixing a few typos in the presentation
</commit_message>
<xml_diff>
--- a/functional.pptx
+++ b/functional.pptx
@@ -20968,7 +20968,7 @@
           <a:lstStyle/>
           <a:p>
             <a:r>
-              <a:rPr lang="en-US" sz="1600">
+              <a:rPr lang="en-US" sz="1600" dirty="0">
                 <a:solidFill>
                   <a:srgbClr val="569CD6"/>
                 </a:solidFill>
@@ -20977,7 +20977,7 @@
               <a:t>function</a:t>
             </a:r>
             <a:r>
-              <a:rPr lang="en-US" sz="1600">
+              <a:rPr lang="en-US" sz="1600" dirty="0">
                 <a:solidFill>
                   <a:srgbClr val="D4D4D4"/>
                 </a:solidFill>
@@ -20986,7 +20986,7 @@
               <a:t> </a:t>
             </a:r>
             <a:r>
-              <a:rPr lang="en-US" sz="1600" err="1">
+              <a:rPr lang="en-US" sz="1600" dirty="0" err="1">
                 <a:solidFill>
                   <a:srgbClr val="DCDCAA"/>
                 </a:solidFill>
@@ -20995,7 +20995,7 @@
               <a:t>incrementAges</a:t>
             </a:r>
             <a:r>
-              <a:rPr lang="en-US" sz="1600">
+              <a:rPr lang="en-US" sz="1600" dirty="0">
                 <a:solidFill>
                   <a:srgbClr val="D4D4D4"/>
                 </a:solidFill>
@@ -21004,7 +21004,7 @@
               <a:t>(</a:t>
             </a:r>
             <a:r>
-              <a:rPr lang="en-US" sz="1600">
+              <a:rPr lang="en-US" sz="1600" dirty="0">
                 <a:solidFill>
                   <a:srgbClr val="9CDCFE"/>
                 </a:solidFill>
@@ -21013,7 +21013,7 @@
               <a:t>ages</a:t>
             </a:r>
             <a:r>
-              <a:rPr lang="en-US" sz="1600">
+              <a:rPr lang="en-US" sz="1600" dirty="0">
                 <a:solidFill>
                   <a:srgbClr val="D4D4D4"/>
                 </a:solidFill>
@@ -21024,7 +21024,7 @@
           </a:p>
           <a:p>
             <a:r>
-              <a:rPr lang="en-US" sz="1600">
+              <a:rPr lang="en-US" sz="1600" dirty="0">
                 <a:solidFill>
                   <a:srgbClr val="D4D4D4"/>
                 </a:solidFill>
@@ -21033,7 +21033,7 @@
               <a:t>    </a:t>
             </a:r>
             <a:r>
-              <a:rPr lang="en-US" sz="1600">
+              <a:rPr lang="en-US" sz="1600" dirty="0">
                 <a:solidFill>
                   <a:srgbClr val="C586C0"/>
                 </a:solidFill>
@@ -21042,7 +21042,7 @@
               <a:t>return</a:t>
             </a:r>
             <a:r>
-              <a:rPr lang="en-US" sz="1600">
+              <a:rPr lang="en-US" sz="1600" dirty="0">
                 <a:solidFill>
                   <a:srgbClr val="D4D4D4"/>
                 </a:solidFill>
@@ -21051,7 +21051,7 @@
               <a:t> </a:t>
             </a:r>
             <a:r>
-              <a:rPr lang="en-US" sz="1600" err="1">
+              <a:rPr lang="en-US" sz="1600" dirty="0" err="1">
                 <a:solidFill>
                   <a:srgbClr val="9CDCFE"/>
                 </a:solidFill>
@@ -21060,7 +21060,7 @@
               <a:t>ages</a:t>
             </a:r>
             <a:r>
-              <a:rPr lang="en-US" sz="1600" err="1">
+              <a:rPr lang="en-US" sz="1600" dirty="0" err="1">
                 <a:solidFill>
                   <a:srgbClr val="D4D4D4"/>
                 </a:solidFill>
@@ -21069,7 +21069,7 @@
               <a:t>.</a:t>
             </a:r>
             <a:r>
-              <a:rPr lang="en-US" sz="1600" err="1">
+              <a:rPr lang="en-US" sz="1600" dirty="0" err="1">
                 <a:solidFill>
                   <a:srgbClr val="DCDCAA"/>
                 </a:solidFill>
@@ -21089,11 +21089,11 @@
             <a:r>
               <a:rPr lang="en-US" sz="1600">
                 <a:solidFill>
-                  <a:srgbClr val="DCDCAA"/>
-                </a:solidFill>
-                <a:latin typeface="Consolas" panose="020B0609020204030204" pitchFamily="49" charset="0"/>
-              </a:rPr>
-              <a:t>map</a:t>
+                  <a:srgbClr val="9CDCFE"/>
+                </a:solidFill>
+                <a:latin typeface="Consolas" panose="020B0609020204030204" pitchFamily="49" charset="0"/>
+              </a:rPr>
+              <a:t>age</a:t>
             </a:r>
             <a:r>
               <a:rPr lang="en-US" sz="1600">
@@ -21105,7 +21105,7 @@
               <a:t> </a:t>
             </a:r>
             <a:r>
-              <a:rPr lang="en-US" sz="1600">
+              <a:rPr lang="en-US" sz="1600" dirty="0">
                 <a:solidFill>
                   <a:srgbClr val="569CD6"/>
                 </a:solidFill>
@@ -21114,7 +21114,7 @@
               <a:t>=&gt;</a:t>
             </a:r>
             <a:r>
-              <a:rPr lang="en-US" sz="1600">
+              <a:rPr lang="en-US" sz="1600" dirty="0">
                 <a:solidFill>
                   <a:srgbClr val="D4D4D4"/>
                 </a:solidFill>
@@ -21123,7 +21123,7 @@
               <a:t> </a:t>
             </a:r>
             <a:r>
-              <a:rPr lang="en-US" sz="1600">
+              <a:rPr lang="en-US" sz="1600" dirty="0">
                 <a:solidFill>
                   <a:srgbClr val="9CDCFE"/>
                 </a:solidFill>
@@ -21132,7 +21132,7 @@
               <a:t>age</a:t>
             </a:r>
             <a:r>
-              <a:rPr lang="en-US" sz="1600">
+              <a:rPr lang="en-US" sz="1600" dirty="0">
                 <a:solidFill>
                   <a:srgbClr val="D4D4D4"/>
                 </a:solidFill>
@@ -21141,7 +21141,7 @@
               <a:t> + </a:t>
             </a:r>
             <a:r>
-              <a:rPr lang="en-US" sz="1600">
+              <a:rPr lang="en-US" sz="1600" dirty="0">
                 <a:solidFill>
                   <a:srgbClr val="B5CEA8"/>
                 </a:solidFill>
@@ -21150,7 +21150,7 @@
               <a:t>1</a:t>
             </a:r>
             <a:r>
-              <a:rPr lang="en-US" sz="1600">
+              <a:rPr lang="en-US" sz="1600" dirty="0">
                 <a:solidFill>
                   <a:srgbClr val="D4D4D4"/>
                 </a:solidFill>
@@ -21161,7 +21161,7 @@
           </a:p>
           <a:p>
             <a:r>
-              <a:rPr lang="en-US" sz="1600">
+              <a:rPr lang="en-US" sz="1600" dirty="0">
                 <a:solidFill>
                   <a:srgbClr val="D4D4D4"/>
                 </a:solidFill>
@@ -21208,7 +21208,7 @@
           <a:lstStyle/>
           <a:p>
             <a:r>
-              <a:rPr lang="en-US" sz="1600">
+              <a:rPr lang="en-US" sz="1600" dirty="0">
                 <a:solidFill>
                   <a:srgbClr val="569CD6"/>
                 </a:solidFill>
@@ -21217,7 +21217,7 @@
               <a:t>const</a:t>
             </a:r>
             <a:r>
-              <a:rPr lang="en-US" sz="1600">
+              <a:rPr lang="en-US" sz="1600" dirty="0">
                 <a:solidFill>
                   <a:srgbClr val="D4D4D4"/>
                 </a:solidFill>
@@ -21226,7 +21226,7 @@
               <a:t> </a:t>
             </a:r>
             <a:r>
-              <a:rPr lang="en-US" sz="1600" err="1">
+              <a:rPr lang="en-US" sz="1600" dirty="0" err="1">
                 <a:solidFill>
                   <a:srgbClr val="DCDCAA"/>
                 </a:solidFill>
@@ -21235,7 +21235,7 @@
               <a:t>incrementAges</a:t>
             </a:r>
             <a:r>
-              <a:rPr lang="en-US" sz="1600">
+              <a:rPr lang="en-US" sz="1600" dirty="0">
                 <a:solidFill>
                   <a:srgbClr val="D4D4D4"/>
                 </a:solidFill>
@@ -21244,7 +21244,7 @@
               <a:t> = </a:t>
             </a:r>
             <a:r>
-              <a:rPr lang="en-US" sz="1600">
+              <a:rPr lang="en-US" sz="1600" dirty="0" err="1">
                 <a:solidFill>
                   <a:srgbClr val="9CDCFE"/>
                 </a:solidFill>
@@ -21253,43 +21253,7 @@
               <a:t>ages</a:t>
             </a:r>
             <a:r>
-              <a:rPr lang="en-US" sz="1600">
-                <a:solidFill>
-                  <a:srgbClr val="D4D4D4"/>
-                </a:solidFill>
-                <a:latin typeface="Consolas" panose="020B0609020204030204" pitchFamily="49" charset="0"/>
-              </a:rPr>
-              <a:t> </a:t>
-            </a:r>
-            <a:r>
-              <a:rPr lang="en-US" sz="1600">
-                <a:solidFill>
-                  <a:srgbClr val="569CD6"/>
-                </a:solidFill>
-                <a:latin typeface="Consolas" panose="020B0609020204030204" pitchFamily="49" charset="0"/>
-              </a:rPr>
-              <a:t>=&gt;</a:t>
-            </a:r>
-            <a:r>
-              <a:rPr lang="en-US" sz="1600">
-                <a:solidFill>
-                  <a:srgbClr val="D4D4D4"/>
-                </a:solidFill>
-                <a:latin typeface="Consolas" panose="020B0609020204030204" pitchFamily="49" charset="0"/>
-              </a:rPr>
-              <a:t> </a:t>
-            </a:r>
-            <a:r>
-              <a:rPr lang="en-US" sz="1600" err="1">
-                <a:solidFill>
-                  <a:srgbClr val="9CDCFE"/>
-                </a:solidFill>
-                <a:latin typeface="Consolas" panose="020B0609020204030204" pitchFamily="49" charset="0"/>
-              </a:rPr>
-              <a:t>ages</a:t>
-            </a:r>
-            <a:r>
-              <a:rPr lang="en-US" sz="1600" err="1">
+              <a:rPr lang="en-US" sz="1600" dirty="0" err="1">
                 <a:solidFill>
                   <a:srgbClr val="D4D4D4"/>
                 </a:solidFill>
@@ -21298,7 +21262,7 @@
               <a:t>.</a:t>
             </a:r>
             <a:r>
-              <a:rPr lang="en-US" sz="1600" err="1">
+              <a:rPr lang="en-US" sz="1600" dirty="0" err="1">
                 <a:solidFill>
                   <a:srgbClr val="DCDCAA"/>
                 </a:solidFill>
@@ -21307,7 +21271,7 @@
               <a:t>map</a:t>
             </a:r>
             <a:r>
-              <a:rPr lang="en-US" sz="1600">
+              <a:rPr lang="en-US" sz="1600" dirty="0">
                 <a:solidFill>
                   <a:srgbClr val="D4D4D4"/>
                 </a:solidFill>
@@ -21316,7 +21280,7 @@
               <a:t>(</a:t>
             </a:r>
             <a:r>
-              <a:rPr lang="en-US" sz="1600">
+              <a:rPr lang="en-US" sz="1600" dirty="0">
                 <a:solidFill>
                   <a:srgbClr val="DCDCAA"/>
                 </a:solidFill>
@@ -21325,7 +21289,7 @@
               <a:t>add</a:t>
             </a:r>
             <a:r>
-              <a:rPr lang="en-US" sz="1600">
+              <a:rPr lang="en-US" sz="1600" dirty="0">
                 <a:solidFill>
                   <a:srgbClr val="D4D4D4"/>
                 </a:solidFill>
@@ -21334,7 +21298,7 @@
               <a:t>(</a:t>
             </a:r>
             <a:r>
-              <a:rPr lang="en-US" sz="1600">
+              <a:rPr lang="en-US" sz="1600" dirty="0">
                 <a:solidFill>
                   <a:srgbClr val="B5CEA8"/>
                 </a:solidFill>
@@ -21343,7 +21307,7 @@
               <a:t>1</a:t>
             </a:r>
             <a:r>
-              <a:rPr lang="en-US" sz="1600">
+              <a:rPr lang="en-US" sz="1600" dirty="0">
                 <a:solidFill>
                   <a:srgbClr val="D4D4D4"/>
                 </a:solidFill>

</xml_diff>